<commit_message>
Updated App Icon in WelcomeActivity and InfoActivity;
</commit_message>
<xml_diff>
--- a/Neurograph App Store Texts/photo maker.pptx
+++ b/Neurograph App Store Texts/photo maker.pptx
@@ -7,6 +7,7 @@
   <p:sldIdLst>
     <p:sldId id="256" r:id="rId2"/>
     <p:sldId id="257" r:id="rId3"/>
+    <p:sldId id="258" r:id="rId4"/>
   </p:sldIdLst>
   <p:sldSz cx="12192000" cy="6858000"/>
   <p:notesSz cx="6858000" cy="9144000"/>
@@ -266,7 +267,7 @@
           <a:p>
             <a:fld id="{09C80E65-8DFA-45CC-9E80-E54AEA9A9DD6}" type="datetimeFigureOut">
               <a:rPr lang="en-AU" smtClean="0"/>
-              <a:t>17/05/2018</a:t>
+              <a:t>18/05/2018</a:t>
             </a:fld>
             <a:endParaRPr lang="en-AU"/>
           </a:p>
@@ -466,7 +467,7 @@
           <a:p>
             <a:fld id="{09C80E65-8DFA-45CC-9E80-E54AEA9A9DD6}" type="datetimeFigureOut">
               <a:rPr lang="en-AU" smtClean="0"/>
-              <a:t>17/05/2018</a:t>
+              <a:t>18/05/2018</a:t>
             </a:fld>
             <a:endParaRPr lang="en-AU"/>
           </a:p>
@@ -676,7 +677,7 @@
           <a:p>
             <a:fld id="{09C80E65-8DFA-45CC-9E80-E54AEA9A9DD6}" type="datetimeFigureOut">
               <a:rPr lang="en-AU" smtClean="0"/>
-              <a:t>17/05/2018</a:t>
+              <a:t>18/05/2018</a:t>
             </a:fld>
             <a:endParaRPr lang="en-AU"/>
           </a:p>
@@ -876,7 +877,7 @@
           <a:p>
             <a:fld id="{09C80E65-8DFA-45CC-9E80-E54AEA9A9DD6}" type="datetimeFigureOut">
               <a:rPr lang="en-AU" smtClean="0"/>
-              <a:t>17/05/2018</a:t>
+              <a:t>18/05/2018</a:t>
             </a:fld>
             <a:endParaRPr lang="en-AU"/>
           </a:p>
@@ -1152,7 +1153,7 @@
           <a:p>
             <a:fld id="{09C80E65-8DFA-45CC-9E80-E54AEA9A9DD6}" type="datetimeFigureOut">
               <a:rPr lang="en-AU" smtClean="0"/>
-              <a:t>17/05/2018</a:t>
+              <a:t>18/05/2018</a:t>
             </a:fld>
             <a:endParaRPr lang="en-AU"/>
           </a:p>
@@ -1420,7 +1421,7 @@
           <a:p>
             <a:fld id="{09C80E65-8DFA-45CC-9E80-E54AEA9A9DD6}" type="datetimeFigureOut">
               <a:rPr lang="en-AU" smtClean="0"/>
-              <a:t>17/05/2018</a:t>
+              <a:t>18/05/2018</a:t>
             </a:fld>
             <a:endParaRPr lang="en-AU"/>
           </a:p>
@@ -1835,7 +1836,7 @@
           <a:p>
             <a:fld id="{09C80E65-8DFA-45CC-9E80-E54AEA9A9DD6}" type="datetimeFigureOut">
               <a:rPr lang="en-AU" smtClean="0"/>
-              <a:t>17/05/2018</a:t>
+              <a:t>18/05/2018</a:t>
             </a:fld>
             <a:endParaRPr lang="en-AU"/>
           </a:p>
@@ -1977,7 +1978,7 @@
           <a:p>
             <a:fld id="{09C80E65-8DFA-45CC-9E80-E54AEA9A9DD6}" type="datetimeFigureOut">
               <a:rPr lang="en-AU" smtClean="0"/>
-              <a:t>17/05/2018</a:t>
+              <a:t>18/05/2018</a:t>
             </a:fld>
             <a:endParaRPr lang="en-AU"/>
           </a:p>
@@ -2090,7 +2091,7 @@
           <a:p>
             <a:fld id="{09C80E65-8DFA-45CC-9E80-E54AEA9A9DD6}" type="datetimeFigureOut">
               <a:rPr lang="en-AU" smtClean="0"/>
-              <a:t>17/05/2018</a:t>
+              <a:t>18/05/2018</a:t>
             </a:fld>
             <a:endParaRPr lang="en-AU"/>
           </a:p>
@@ -2403,7 +2404,7 @@
           <a:p>
             <a:fld id="{09C80E65-8DFA-45CC-9E80-E54AEA9A9DD6}" type="datetimeFigureOut">
               <a:rPr lang="en-AU" smtClean="0"/>
-              <a:t>17/05/2018</a:t>
+              <a:t>18/05/2018</a:t>
             </a:fld>
             <a:endParaRPr lang="en-AU"/>
           </a:p>
@@ -2692,7 +2693,7 @@
           <a:p>
             <a:fld id="{09C80E65-8DFA-45CC-9E80-E54AEA9A9DD6}" type="datetimeFigureOut">
               <a:rPr lang="en-AU" smtClean="0"/>
-              <a:t>17/05/2018</a:t>
+              <a:t>18/05/2018</a:t>
             </a:fld>
             <a:endParaRPr lang="en-AU"/>
           </a:p>
@@ -2935,7 +2936,7 @@
           <a:p>
             <a:fld id="{09C80E65-8DFA-45CC-9E80-E54AEA9A9DD6}" type="datetimeFigureOut">
               <a:rPr lang="en-AU" smtClean="0"/>
-              <a:t>17/05/2018</a:t>
+              <a:t>18/05/2018</a:t>
             </a:fld>
             <a:endParaRPr lang="en-AU"/>
           </a:p>
@@ -3554,6 +3555,161 @@
 </p:sld>
 </file>
 
+<file path=ppt/slides/slide3.xml><?xml version="1.0" encoding="utf-8"?>
+<p:sld xmlns:a="http://schemas.openxmlformats.org/drawingml/2006/main" xmlns:r="http://schemas.openxmlformats.org/officeDocument/2006/relationships" xmlns:p="http://schemas.openxmlformats.org/presentationml/2006/main">
+  <p:cSld>
+    <p:spTree>
+      <p:nvGrpSpPr>
+        <p:cNvPr id="1" name=""/>
+        <p:cNvGrpSpPr/>
+        <p:nvPr/>
+      </p:nvGrpSpPr>
+      <p:grpSpPr>
+        <a:xfrm>
+          <a:off x="0" y="0"/>
+          <a:ext cx="0" cy="0"/>
+          <a:chOff x="0" y="0"/>
+          <a:chExt cx="0" cy="0"/>
+        </a:xfrm>
+      </p:grpSpPr>
+      <p:sp>
+        <p:nvSpPr>
+          <p:cNvPr id="4" name="Rectangle 3">
+            <a:extLst>
+              <a:ext uri="{FF2B5EF4-FFF2-40B4-BE49-F238E27FC236}">
+                <a16:creationId xmlns:a16="http://schemas.microsoft.com/office/drawing/2014/main" id="{2C6A0F39-1696-4302-9FD2-EDFF7C19E18D}"/>
+              </a:ext>
+            </a:extLst>
+          </p:cNvPr>
+          <p:cNvSpPr/>
+          <p:nvPr/>
+        </p:nvSpPr>
+        <p:spPr>
+          <a:xfrm>
+            <a:off x="2789304" y="945136"/>
+            <a:ext cx="5647763" cy="3065929"/>
+          </a:xfrm>
+          <a:prstGeom prst="rect">
+            <a:avLst/>
+          </a:prstGeom>
+          <a:solidFill>
+            <a:schemeClr val="bg1"/>
+          </a:solidFill>
+          <a:ln>
+            <a:noFill/>
+          </a:ln>
+        </p:spPr>
+        <p:style>
+          <a:lnRef idx="2">
+            <a:schemeClr val="accent1">
+              <a:shade val="50000"/>
+            </a:schemeClr>
+          </a:lnRef>
+          <a:fillRef idx="1">
+            <a:schemeClr val="accent1"/>
+          </a:fillRef>
+          <a:effectRef idx="0">
+            <a:schemeClr val="accent1"/>
+          </a:effectRef>
+          <a:fontRef idx="minor">
+            <a:schemeClr val="lt1"/>
+          </a:fontRef>
+        </p:style>
+        <p:txBody>
+          <a:bodyPr rtlCol="0" anchor="ctr"/>
+          <a:lstStyle/>
+          <a:p>
+            <a:pPr algn="ctr"/>
+            <a:endParaRPr lang="en-AU"/>
+          </a:p>
+        </p:txBody>
+      </p:sp>
+      <p:pic>
+        <p:nvPicPr>
+          <p:cNvPr id="6" name="Picture 5">
+            <a:extLst>
+              <a:ext uri="{FF2B5EF4-FFF2-40B4-BE49-F238E27FC236}">
+                <a16:creationId xmlns:a16="http://schemas.microsoft.com/office/drawing/2014/main" id="{1F69CDC7-3B8D-4297-A7A3-DEF62428BAED}"/>
+              </a:ext>
+            </a:extLst>
+          </p:cNvPr>
+          <p:cNvPicPr>
+            <a:picLocks noChangeAspect="1"/>
+          </p:cNvPicPr>
+          <p:nvPr/>
+        </p:nvPicPr>
+        <p:blipFill>
+          <a:blip r:embed="rId2">
+            <a:extLst>
+              <a:ext uri="{28A0092B-C50C-407E-A947-70E740481C1C}">
+                <a14:useLocalDpi xmlns:a14="http://schemas.microsoft.com/office/drawing/2010/main" val="0"/>
+              </a:ext>
+            </a:extLst>
+          </a:blip>
+          <a:stretch>
+            <a:fillRect/>
+          </a:stretch>
+        </p:blipFill>
+        <p:spPr>
+          <a:xfrm>
+            <a:off x="3171904" y="1844968"/>
+            <a:ext cx="1335421" cy="1335421"/>
+          </a:xfrm>
+          <a:prstGeom prst="rect">
+            <a:avLst/>
+          </a:prstGeom>
+        </p:spPr>
+      </p:pic>
+      <p:sp>
+        <p:nvSpPr>
+          <p:cNvPr id="7" name="TextBox 6">
+            <a:extLst>
+              <a:ext uri="{FF2B5EF4-FFF2-40B4-BE49-F238E27FC236}">
+                <a16:creationId xmlns:a16="http://schemas.microsoft.com/office/drawing/2014/main" id="{E408DB9D-03EA-4A42-BC8F-FAD6898EA250}"/>
+              </a:ext>
+            </a:extLst>
+          </p:cNvPr>
+          <p:cNvSpPr txBox="1"/>
+          <p:nvPr/>
+        </p:nvSpPr>
+        <p:spPr>
+          <a:xfrm>
+            <a:off x="4679576" y="2189512"/>
+            <a:ext cx="3519288" cy="600164"/>
+          </a:xfrm>
+          <a:prstGeom prst="rect">
+            <a:avLst/>
+          </a:prstGeom>
+          <a:noFill/>
+        </p:spPr>
+        <p:txBody>
+          <a:bodyPr wrap="square" rtlCol="0">
+            <a:spAutoFit/>
+          </a:bodyPr>
+          <a:lstStyle/>
+          <a:p>
+            <a:r>
+              <a:rPr lang="en-AU" sz="3300" dirty="0">
+                <a:latin typeface="Segoe Print" panose="02000600000000000000" pitchFamily="2" charset="0"/>
+              </a:rPr>
+              <a:t>NEUROGRAPH</a:t>
+            </a:r>
+          </a:p>
+        </p:txBody>
+      </p:sp>
+    </p:spTree>
+    <p:extLst>
+      <p:ext uri="{BB962C8B-B14F-4D97-AF65-F5344CB8AC3E}">
+        <p14:creationId xmlns:p14="http://schemas.microsoft.com/office/powerpoint/2010/main" val="2457016189"/>
+      </p:ext>
+    </p:extLst>
+  </p:cSld>
+  <p:clrMapOvr>
+    <a:masterClrMapping/>
+  </p:clrMapOvr>
+</p:sld>
+</file>
+
 <file path=ppt/theme/theme1.xml><?xml version="1.0" encoding="utf-8"?>
 <a:theme xmlns:a="http://schemas.openxmlformats.org/drawingml/2006/main" name="Office Theme">
   <a:themeElements>

</xml_diff>